<commit_message>
Collision with Enemy loose the game, textures added, animations added, Working in the option to increase or decrease the healt and Levels
</commit_message>
<xml_diff>
--- a/src/main/resources/assets/ppx/textures.pptx
+++ b/src/main/resources/assets/ppx/textures.pptx
@@ -6,6 +6,7 @@
   </p:sldMasterIdLst>
   <p:sldIdLst>
     <p:sldId id="256" r:id="rId2"/>
+    <p:sldId id="257" r:id="rId3"/>
   </p:sldIdLst>
   <p:sldSz cx="12192000" cy="6858000"/>
   <p:notesSz cx="6858000" cy="9144000"/>
@@ -104,6 +105,11 @@
       </a:defRPr>
     </a:lvl9pPr>
   </p:defaultTextStyle>
+  <p:extLst>
+    <p:ext uri="{EFAFB233-063F-42B5-8137-9DF3F51BA10A}">
+      <p15:sldGuideLst xmlns:p15="http://schemas.microsoft.com/office/powerpoint/2012/main"/>
+    </p:ext>
+  </p:extLst>
 </p:presentation>
 </file>
 
@@ -4804,10 +4810,478 @@
           </a:prstGeom>
         </p:spPr>
       </p:pic>
+      <p:pic>
+        <p:nvPicPr>
+          <p:cNvPr id="3" name="Imagen 2">
+            <a:extLst>
+              <a:ext uri="{FF2B5EF4-FFF2-40B4-BE49-F238E27FC236}">
+                <a16:creationId xmlns:a16="http://schemas.microsoft.com/office/drawing/2014/main" id="{0819105B-32EB-496C-89AA-B02C4600508F}"/>
+              </a:ext>
+            </a:extLst>
+          </p:cNvPr>
+          <p:cNvPicPr>
+            <a:picLocks noChangeAspect="1"/>
+          </p:cNvPicPr>
+          <p:nvPr/>
+        </p:nvPicPr>
+        <p:blipFill>
+          <a:blip r:embed="rId2">
+            <a:extLst>
+              <a:ext uri="{28A0092B-C50C-407E-A947-70E740481C1C}">
+                <a14:useLocalDpi xmlns:a14="http://schemas.microsoft.com/office/drawing/2010/main" val="0"/>
+              </a:ext>
+            </a:extLst>
+          </a:blip>
+          <a:stretch>
+            <a:fillRect/>
+          </a:stretch>
+        </p:blipFill>
+        <p:spPr>
+          <a:xfrm>
+            <a:off x="9441235" y="570145"/>
+            <a:ext cx="2471066" cy="3294754"/>
+          </a:xfrm>
+          <a:prstGeom prst="rect">
+            <a:avLst/>
+          </a:prstGeom>
+        </p:spPr>
+      </p:pic>
     </p:spTree>
     <p:extLst>
       <p:ext uri="{BB962C8B-B14F-4D97-AF65-F5344CB8AC3E}">
         <p14:creationId xmlns:p14="http://schemas.microsoft.com/office/powerpoint/2010/main" val="1664356365"/>
+      </p:ext>
+    </p:extLst>
+  </p:cSld>
+  <p:clrMapOvr>
+    <a:masterClrMapping/>
+  </p:clrMapOvr>
+</p:sld>
+</file>
+
+<file path=ppt/slides/slide2.xml><?xml version="1.0" encoding="utf-8"?>
+<p:sld xmlns:a="http://schemas.openxmlformats.org/drawingml/2006/main" xmlns:r="http://schemas.openxmlformats.org/officeDocument/2006/relationships" xmlns:p="http://schemas.openxmlformats.org/presentationml/2006/main">
+  <p:cSld>
+    <p:spTree>
+      <p:nvGrpSpPr>
+        <p:cNvPr id="1" name=""/>
+        <p:cNvGrpSpPr/>
+        <p:nvPr/>
+      </p:nvGrpSpPr>
+      <p:grpSpPr>
+        <a:xfrm>
+          <a:off x="0" y="0"/>
+          <a:ext cx="0" cy="0"/>
+          <a:chOff x="0" y="0"/>
+          <a:chExt cx="0" cy="0"/>
+        </a:xfrm>
+      </p:grpSpPr>
+      <p:pic>
+        <p:nvPicPr>
+          <p:cNvPr id="4" name="Imagen 3">
+            <a:extLst>
+              <a:ext uri="{FF2B5EF4-FFF2-40B4-BE49-F238E27FC236}">
+                <a16:creationId xmlns:a16="http://schemas.microsoft.com/office/drawing/2014/main" id="{25AE0BFC-339A-453F-BF78-AA5A0E0AF62A}"/>
+              </a:ext>
+            </a:extLst>
+          </p:cNvPr>
+          <p:cNvPicPr>
+            <a:picLocks noChangeAspect="1"/>
+          </p:cNvPicPr>
+          <p:nvPr/>
+        </p:nvPicPr>
+        <p:blipFill rotWithShape="1">
+          <a:blip r:embed="rId2">
+            <a:duotone>
+              <a:schemeClr val="accent6">
+                <a:shade val="45000"/>
+                <a:satMod val="135000"/>
+              </a:schemeClr>
+              <a:prstClr val="white"/>
+            </a:duotone>
+            <a:extLst>
+              <a:ext uri="{28A0092B-C50C-407E-A947-70E740481C1C}">
+                <a14:useLocalDpi xmlns:a14="http://schemas.microsoft.com/office/drawing/2010/main" val="0"/>
+              </a:ext>
+            </a:extLst>
+          </a:blip>
+          <a:srcRect t="24973" b="49348"/>
+          <a:stretch/>
+        </p:blipFill>
+        <p:spPr>
+          <a:xfrm>
+            <a:off x="4057163" y="1251956"/>
+            <a:ext cx="2471066" cy="846035"/>
+          </a:xfrm>
+          <a:prstGeom prst="rect">
+            <a:avLst/>
+          </a:prstGeom>
+        </p:spPr>
+      </p:pic>
+      <p:pic>
+        <p:nvPicPr>
+          <p:cNvPr id="5" name="Imagen 4">
+            <a:extLst>
+              <a:ext uri="{FF2B5EF4-FFF2-40B4-BE49-F238E27FC236}">
+                <a16:creationId xmlns:a16="http://schemas.microsoft.com/office/drawing/2014/main" id="{FE0212C4-BFB3-4CEB-B642-B5A451D456E7}"/>
+              </a:ext>
+            </a:extLst>
+          </p:cNvPr>
+          <p:cNvPicPr>
+            <a:picLocks noChangeAspect="1"/>
+          </p:cNvPicPr>
+          <p:nvPr/>
+        </p:nvPicPr>
+        <p:blipFill rotWithShape="1">
+          <a:blip r:embed="rId2">
+            <a:extLst>
+              <a:ext uri="{28A0092B-C50C-407E-A947-70E740481C1C}">
+                <a14:useLocalDpi xmlns:a14="http://schemas.microsoft.com/office/drawing/2010/main" val="0"/>
+              </a:ext>
+            </a:extLst>
+          </a:blip>
+          <a:srcRect b="74322"/>
+          <a:stretch/>
+        </p:blipFill>
+        <p:spPr>
+          <a:xfrm>
+            <a:off x="1074902" y="1230593"/>
+            <a:ext cx="2471066" cy="846035"/>
+          </a:xfrm>
+          <a:prstGeom prst="rect">
+            <a:avLst/>
+          </a:prstGeom>
+        </p:spPr>
+      </p:pic>
+      <p:pic>
+        <p:nvPicPr>
+          <p:cNvPr id="6" name="Imagen 5">
+            <a:extLst>
+              <a:ext uri="{FF2B5EF4-FFF2-40B4-BE49-F238E27FC236}">
+                <a16:creationId xmlns:a16="http://schemas.microsoft.com/office/drawing/2014/main" id="{474B6E37-793A-45F1-ACF1-ADC632C68D57}"/>
+              </a:ext>
+            </a:extLst>
+          </p:cNvPr>
+          <p:cNvPicPr>
+            <a:picLocks noChangeAspect="1"/>
+          </p:cNvPicPr>
+          <p:nvPr/>
+        </p:nvPicPr>
+        <p:blipFill rotWithShape="1">
+          <a:blip r:embed="rId2">
+            <a:duotone>
+              <a:prstClr val="black"/>
+              <a:schemeClr val="accent6">
+                <a:tint val="45000"/>
+                <a:satMod val="400000"/>
+              </a:schemeClr>
+            </a:duotone>
+            <a:extLst>
+              <a:ext uri="{28A0092B-C50C-407E-A947-70E740481C1C}">
+                <a14:useLocalDpi xmlns:a14="http://schemas.microsoft.com/office/drawing/2010/main" val="0"/>
+              </a:ext>
+            </a:extLst>
+          </a:blip>
+          <a:srcRect l="65793" t="24973" b="49348"/>
+          <a:stretch/>
+        </p:blipFill>
+        <p:spPr>
+          <a:xfrm>
+            <a:off x="5673362" y="1251956"/>
+            <a:ext cx="845276" cy="846035"/>
+          </a:xfrm>
+          <a:prstGeom prst="rect">
+            <a:avLst/>
+          </a:prstGeom>
+        </p:spPr>
+      </p:pic>
+      <p:pic>
+        <p:nvPicPr>
+          <p:cNvPr id="7" name="Imagen 6">
+            <a:extLst>
+              <a:ext uri="{FF2B5EF4-FFF2-40B4-BE49-F238E27FC236}">
+                <a16:creationId xmlns:a16="http://schemas.microsoft.com/office/drawing/2014/main" id="{1EC9466A-2FC7-4F10-B09B-077E67D53D31}"/>
+              </a:ext>
+            </a:extLst>
+          </p:cNvPr>
+          <p:cNvPicPr>
+            <a:picLocks noChangeAspect="1"/>
+          </p:cNvPicPr>
+          <p:nvPr/>
+        </p:nvPicPr>
+        <p:blipFill>
+          <a:blip r:embed="rId3">
+            <a:extLst>
+              <a:ext uri="{28A0092B-C50C-407E-A947-70E740481C1C}">
+                <a14:useLocalDpi xmlns:a14="http://schemas.microsoft.com/office/drawing/2010/main" val="0"/>
+              </a:ext>
+            </a:extLst>
+          </a:blip>
+          <a:stretch>
+            <a:fillRect/>
+          </a:stretch>
+        </p:blipFill>
+        <p:spPr>
+          <a:xfrm>
+            <a:off x="7039424" y="1251956"/>
+            <a:ext cx="1593579" cy="546932"/>
+          </a:xfrm>
+          <a:prstGeom prst="rect">
+            <a:avLst/>
+          </a:prstGeom>
+        </p:spPr>
+      </p:pic>
+      <p:pic>
+        <p:nvPicPr>
+          <p:cNvPr id="9" name="Imagen 8">
+            <a:extLst>
+              <a:ext uri="{FF2B5EF4-FFF2-40B4-BE49-F238E27FC236}">
+                <a16:creationId xmlns:a16="http://schemas.microsoft.com/office/drawing/2014/main" id="{CF63C91B-6CF4-49D1-81A8-243FFA5583BC}"/>
+              </a:ext>
+            </a:extLst>
+          </p:cNvPr>
+          <p:cNvPicPr>
+            <a:picLocks noChangeAspect="1"/>
+          </p:cNvPicPr>
+          <p:nvPr/>
+        </p:nvPicPr>
+        <p:blipFill>
+          <a:blip r:embed="rId4">
+            <a:extLst>
+              <a:ext uri="{BEBA8EAE-BF5A-486C-A8C5-ECC9F3942E4B}">
+                <a14:imgProps xmlns:a14="http://schemas.microsoft.com/office/drawing/2010/main">
+                  <a14:imgLayer r:embed="rId5">
+                    <a14:imgEffect>
+                      <a14:backgroundRemoval t="10000" b="90000" l="10000" r="90000"/>
+                    </a14:imgEffect>
+                    <a14:imgEffect>
+                      <a14:saturation sat="400000"/>
+                    </a14:imgEffect>
+                  </a14:imgLayer>
+                </a14:imgProps>
+              </a:ext>
+              <a:ext uri="{28A0092B-C50C-407E-A947-70E740481C1C}">
+                <a14:useLocalDpi xmlns:a14="http://schemas.microsoft.com/office/drawing/2010/main" val="0"/>
+              </a:ext>
+            </a:extLst>
+          </a:blip>
+          <a:stretch>
+            <a:fillRect/>
+          </a:stretch>
+        </p:blipFill>
+        <p:spPr>
+          <a:xfrm>
+            <a:off x="4690346" y="2808231"/>
+            <a:ext cx="845276" cy="845276"/>
+          </a:xfrm>
+          <a:prstGeom prst="rect">
+            <a:avLst/>
+          </a:prstGeom>
+        </p:spPr>
+      </p:pic>
+      <p:pic>
+        <p:nvPicPr>
+          <p:cNvPr id="1028" name="Picture 4" descr="Face Mask Safety Respiratory Protection Equipment Vector ...">
+            <a:extLst>
+              <a:ext uri="{FF2B5EF4-FFF2-40B4-BE49-F238E27FC236}">
+                <a16:creationId xmlns:a16="http://schemas.microsoft.com/office/drawing/2014/main" id="{7305EB6E-59A0-4960-98CB-A109C2D2540B}"/>
+              </a:ext>
+            </a:extLst>
+          </p:cNvPr>
+          <p:cNvPicPr>
+            <a:picLocks noChangeAspect="1" noChangeArrowheads="1"/>
+          </p:cNvPicPr>
+          <p:nvPr/>
+        </p:nvPicPr>
+        <p:blipFill>
+          <a:blip r:embed="rId6">
+            <a:extLst>
+              <a:ext uri="{BEBA8EAE-BF5A-486C-A8C5-ECC9F3942E4B}">
+                <a14:imgProps xmlns:a14="http://schemas.microsoft.com/office/drawing/2010/main">
+                  <a14:imgLayer r:embed="rId7">
+                    <a14:imgEffect>
+                      <a14:backgroundRemoval t="10000" b="90000" l="10000" r="90000"/>
+                    </a14:imgEffect>
+                  </a14:imgLayer>
+                </a14:imgProps>
+              </a:ext>
+              <a:ext uri="{28A0092B-C50C-407E-A947-70E740481C1C}">
+                <a14:useLocalDpi xmlns:a14="http://schemas.microsoft.com/office/drawing/2010/main" val="0"/>
+              </a:ext>
+            </a:extLst>
+          </a:blip>
+          <a:srcRect/>
+          <a:stretch>
+            <a:fillRect/>
+          </a:stretch>
+        </p:blipFill>
+        <p:spPr bwMode="auto">
+          <a:xfrm>
+            <a:off x="821631" y="2808790"/>
+            <a:ext cx="845276" cy="845276"/>
+          </a:xfrm>
+          <a:prstGeom prst="rect">
+            <a:avLst/>
+          </a:prstGeom>
+          <a:noFill/>
+          <a:extLst>
+            <a:ext uri="{909E8E84-426E-40DD-AFC4-6F175D3DCCD1}">
+              <a14:hiddenFill xmlns:a14="http://schemas.microsoft.com/office/drawing/2010/main">
+                <a:solidFill>
+                  <a:srgbClr val="FFFFFF"/>
+                </a:solidFill>
+              </a14:hiddenFill>
+            </a:ext>
+          </a:extLst>
+        </p:spPr>
+      </p:pic>
+      <p:pic>
+        <p:nvPicPr>
+          <p:cNvPr id="12" name="Picture 4" descr="Face Mask Safety Respiratory Protection Equipment Vector ...">
+            <a:extLst>
+              <a:ext uri="{FF2B5EF4-FFF2-40B4-BE49-F238E27FC236}">
+                <a16:creationId xmlns:a16="http://schemas.microsoft.com/office/drawing/2014/main" id="{7AAFC987-29D6-4E2C-BC7B-1075C4869840}"/>
+              </a:ext>
+            </a:extLst>
+          </p:cNvPr>
+          <p:cNvPicPr>
+            <a:picLocks noChangeAspect="1" noChangeArrowheads="1"/>
+          </p:cNvPicPr>
+          <p:nvPr/>
+        </p:nvPicPr>
+        <p:blipFill>
+          <a:blip r:embed="rId8">
+            <a:extLst>
+              <a:ext uri="{BEBA8EAE-BF5A-486C-A8C5-ECC9F3942E4B}">
+                <a14:imgProps xmlns:a14="http://schemas.microsoft.com/office/drawing/2010/main">
+                  <a14:imgLayer r:embed="rId7">
+                    <a14:imgEffect>
+                      <a14:backgroundRemoval t="10000" b="90000" l="10000" r="90000"/>
+                    </a14:imgEffect>
+                    <a14:imgEffect>
+                      <a14:saturation sat="400000"/>
+                    </a14:imgEffect>
+                  </a14:imgLayer>
+                </a14:imgProps>
+              </a:ext>
+              <a:ext uri="{28A0092B-C50C-407E-A947-70E740481C1C}">
+                <a14:useLocalDpi xmlns:a14="http://schemas.microsoft.com/office/drawing/2010/main" val="0"/>
+              </a:ext>
+            </a:extLst>
+          </a:blip>
+          <a:srcRect/>
+          <a:stretch>
+            <a:fillRect/>
+          </a:stretch>
+        </p:blipFill>
+        <p:spPr bwMode="auto">
+          <a:xfrm>
+            <a:off x="1666907" y="2808231"/>
+            <a:ext cx="845276" cy="845276"/>
+          </a:xfrm>
+          <a:prstGeom prst="rect">
+            <a:avLst/>
+          </a:prstGeom>
+          <a:noFill/>
+          <a:extLst>
+            <a:ext uri="{909E8E84-426E-40DD-AFC4-6F175D3DCCD1}">
+              <a14:hiddenFill xmlns:a14="http://schemas.microsoft.com/office/drawing/2010/main">
+                <a:solidFill>
+                  <a:srgbClr val="FFFFFF"/>
+                </a:solidFill>
+              </a14:hiddenFill>
+            </a:ext>
+          </a:extLst>
+        </p:spPr>
+      </p:pic>
+      <p:pic>
+        <p:nvPicPr>
+          <p:cNvPr id="13" name="Imagen 12">
+            <a:extLst>
+              <a:ext uri="{FF2B5EF4-FFF2-40B4-BE49-F238E27FC236}">
+                <a16:creationId xmlns:a16="http://schemas.microsoft.com/office/drawing/2014/main" id="{AFF867C5-DD62-46B3-BAEB-7551D39BF087}"/>
+              </a:ext>
+            </a:extLst>
+          </p:cNvPr>
+          <p:cNvPicPr>
+            <a:picLocks noChangeAspect="1"/>
+          </p:cNvPicPr>
+          <p:nvPr/>
+        </p:nvPicPr>
+        <p:blipFill>
+          <a:blip r:embed="rId9">
+            <a:extLst>
+              <a:ext uri="{BEBA8EAE-BF5A-486C-A8C5-ECC9F3942E4B}">
+                <a14:imgProps xmlns:a14="http://schemas.microsoft.com/office/drawing/2010/main">
+                  <a14:imgLayer r:embed="rId5">
+                    <a14:imgEffect>
+                      <a14:backgroundRemoval t="10000" b="90000" l="10000" r="90000"/>
+                    </a14:imgEffect>
+                    <a14:imgEffect>
+                      <a14:saturation sat="33000"/>
+                    </a14:imgEffect>
+                  </a14:imgLayer>
+                </a14:imgProps>
+              </a:ext>
+              <a:ext uri="{28A0092B-C50C-407E-A947-70E740481C1C}">
+                <a14:useLocalDpi xmlns:a14="http://schemas.microsoft.com/office/drawing/2010/main" val="0"/>
+              </a:ext>
+            </a:extLst>
+          </a:blip>
+          <a:stretch>
+            <a:fillRect/>
+          </a:stretch>
+        </p:blipFill>
+        <p:spPr>
+          <a:xfrm>
+            <a:off x="3845070" y="2808231"/>
+            <a:ext cx="845276" cy="845276"/>
+          </a:xfrm>
+          <a:prstGeom prst="rect">
+            <a:avLst/>
+          </a:prstGeom>
+        </p:spPr>
+      </p:pic>
+      <p:pic>
+        <p:nvPicPr>
+          <p:cNvPr id="3" name="Imagen 2">
+            <a:extLst>
+              <a:ext uri="{FF2B5EF4-FFF2-40B4-BE49-F238E27FC236}">
+                <a16:creationId xmlns:a16="http://schemas.microsoft.com/office/drawing/2014/main" id="{7826EB7F-418C-4544-9B73-A1EA12F88CA5}"/>
+              </a:ext>
+            </a:extLst>
+          </p:cNvPr>
+          <p:cNvPicPr>
+            <a:picLocks noChangeAspect="1"/>
+          </p:cNvPicPr>
+          <p:nvPr/>
+        </p:nvPicPr>
+        <p:blipFill>
+          <a:blip r:embed="rId10">
+            <a:extLst>
+              <a:ext uri="{28A0092B-C50C-407E-A947-70E740481C1C}">
+                <a14:useLocalDpi xmlns:a14="http://schemas.microsoft.com/office/drawing/2010/main" val="0"/>
+              </a:ext>
+            </a:extLst>
+          </a:blip>
+          <a:stretch>
+            <a:fillRect/>
+          </a:stretch>
+        </p:blipFill>
+        <p:spPr>
+          <a:xfrm>
+            <a:off x="7039425" y="1251956"/>
+            <a:ext cx="1097828" cy="546932"/>
+          </a:xfrm>
+          <a:prstGeom prst="rect">
+            <a:avLst/>
+          </a:prstGeom>
+        </p:spPr>
+      </p:pic>
+    </p:spTree>
+    <p:extLst>
+      <p:ext uri="{BB962C8B-B14F-4D97-AF65-F5344CB8AC3E}">
+        <p14:creationId xmlns:p14="http://schemas.microsoft.com/office/powerpoint/2010/main" val="503147545"/>
       </p:ext>
     </p:extLst>
   </p:cSld>

</xml_diff>